<commit_message>
added ref and vector page to slide
</commit_message>
<xml_diff>
--- a/cppsample.pptx
+++ b/cppsample.pptx
@@ -9,8 +9,9 @@
     <p:sldId id="258" r:id="rId3"/>
     <p:sldId id="263" r:id="rId4"/>
     <p:sldId id="261" r:id="rId5"/>
-    <p:sldId id="262" r:id="rId6"/>
-    <p:sldId id="259" r:id="rId7"/>
+    <p:sldId id="264" r:id="rId6"/>
+    <p:sldId id="262" r:id="rId7"/>
+    <p:sldId id="259" r:id="rId8"/>
   </p:sldIdLst>
   <p:sldSz cx="12192000" cy="6858000"/>
   <p:notesSz cx="6858000" cy="9144000"/>
@@ -4342,29 +4343,6 @@
       </p:grpSpPr>
       <p:sp>
         <p:nvSpPr>
-          <p:cNvPr id="2" name="タイトル 1"/>
-          <p:cNvSpPr>
-            <a:spLocks noGrp="1"/>
-          </p:cNvSpPr>
-          <p:nvPr>
-            <p:ph type="title"/>
-          </p:nvPr>
-        </p:nvSpPr>
-        <p:spPr/>
-        <p:txBody>
-          <a:bodyPr/>
-          <a:lstStyle/>
-          <a:p>
-            <a:r>
-              <a:rPr kumimoji="1" lang="ja-JP" altLang="en-US" dirty="0" smtClean="0"/>
-              <a:t>だから、スタックにあるものを戻しても大丈夫</a:t>
-            </a:r>
-            <a:endParaRPr kumimoji="1" lang="ja-JP" altLang="en-US" dirty="0"/>
-          </a:p>
-        </p:txBody>
-      </p:sp>
-      <p:sp>
-        <p:nvSpPr>
           <p:cNvPr id="3" name="コンテンツ プレースホルダー 2"/>
           <p:cNvSpPr>
             <a:spLocks noGrp="1"/>
@@ -4375,98 +4353,15 @@
         </p:nvSpPr>
         <p:spPr>
           <a:xfrm>
-            <a:off x="838200" y="1288473"/>
-            <a:ext cx="10515600" cy="4888490"/>
+            <a:off x="838200" y="1374659"/>
+            <a:ext cx="7599218" cy="5140441"/>
           </a:xfrm>
         </p:spPr>
         <p:txBody>
-          <a:bodyPr/>
-          <a:lstStyle/>
-          <a:p>
-            <a:pPr marL="0" indent="0">
-              <a:buNone/>
-            </a:pPr>
-            <a:r>
-              <a:rPr lang="en-US" altLang="ja-JP" dirty="0" smtClean="0"/>
-              <a:t>vector&lt;Base&gt; </a:t>
-            </a:r>
-            <a:r>
-              <a:rPr lang="en-US" altLang="ja-JP" dirty="0" err="1" smtClean="0"/>
-              <a:t>func</a:t>
-            </a:r>
-            <a:r>
-              <a:rPr lang="en-US" altLang="ja-JP" dirty="0" smtClean="0"/>
-              <a:t>() </a:t>
-            </a:r>
-            <a:r>
-              <a:rPr kumimoji="1" lang="en-US" altLang="ja-JP" dirty="0" smtClean="0"/>
-              <a:t>{</a:t>
-            </a:r>
-          </a:p>
-          <a:p>
-            <a:pPr marL="0" indent="0">
-              <a:buNone/>
-            </a:pPr>
-            <a:r>
-              <a:rPr lang="en-US" altLang="ja-JP" dirty="0"/>
-              <a:t> </a:t>
-            </a:r>
-            <a:r>
-              <a:rPr lang="en-US" altLang="ja-JP" dirty="0" smtClean="0"/>
-              <a:t>   Base a;</a:t>
-            </a:r>
-          </a:p>
-          <a:p>
-            <a:pPr marL="0" indent="0">
-              <a:buNone/>
-            </a:pPr>
-            <a:r>
-              <a:rPr kumimoji="1" lang="en-US" altLang="ja-JP" dirty="0" smtClean="0"/>
-              <a:t>    Base b;</a:t>
-            </a:r>
-          </a:p>
-          <a:p>
-            <a:pPr marL="0" indent="0">
-              <a:buNone/>
-            </a:pPr>
-            <a:r>
-              <a:rPr lang="en-US" altLang="ja-JP" dirty="0"/>
-              <a:t> </a:t>
-            </a:r>
-            <a:r>
-              <a:rPr lang="en-US" altLang="ja-JP" dirty="0" smtClean="0"/>
-              <a:t>    vector&lt;Base&gt; </a:t>
-            </a:r>
-            <a:r>
-              <a:rPr lang="en-US" altLang="ja-JP" dirty="0" err="1" smtClean="0"/>
-              <a:t>vec</a:t>
-            </a:r>
-            <a:r>
-              <a:rPr lang="en-US" altLang="ja-JP" dirty="0" smtClean="0"/>
-              <a:t>;</a:t>
-            </a:r>
-          </a:p>
-          <a:p>
-            <a:pPr marL="0" indent="0">
-              <a:buNone/>
-            </a:pPr>
-            <a:r>
-              <a:rPr lang="en-US" altLang="ja-JP" dirty="0"/>
-              <a:t> </a:t>
-            </a:r>
-            <a:r>
-              <a:rPr lang="en-US" altLang="ja-JP" dirty="0" smtClean="0"/>
-              <a:t>   </a:t>
-            </a:r>
-            <a:r>
-              <a:rPr lang="en-US" altLang="ja-JP" dirty="0" err="1" smtClean="0"/>
-              <a:t>vec.push_back</a:t>
-            </a:r>
-            <a:r>
-              <a:rPr lang="en-US" altLang="ja-JP" dirty="0" smtClean="0"/>
-              <a:t>(a);</a:t>
-            </a:r>
-          </a:p>
+          <a:bodyPr>
+            <a:normAutofit/>
+          </a:bodyPr>
+          <a:lstStyle/>
           <a:p>
             <a:pPr marL="0" indent="0">
               <a:buNone/>
@@ -4476,12 +4371,151 @@
               <a:t>    </a:t>
             </a:r>
             <a:r>
-              <a:rPr lang="en-US" altLang="ja-JP" dirty="0" err="1" smtClean="0"/>
+              <a:rPr lang="en-US" altLang="ja-JP" dirty="0" err="1"/>
+              <a:t>int</a:t>
+            </a:r>
+            <a:r>
+              <a:rPr lang="en-US" altLang="ja-JP" dirty="0"/>
+              <a:t> a=1;</a:t>
+            </a:r>
+          </a:p>
+          <a:p>
+            <a:pPr marL="0" indent="0">
+              <a:buNone/>
+            </a:pPr>
+            <a:r>
+              <a:rPr lang="en-US" altLang="ja-JP" dirty="0"/>
+              <a:t>    </a:t>
+            </a:r>
+            <a:r>
+              <a:rPr lang="en-US" altLang="ja-JP" dirty="0" err="1"/>
+              <a:t>int</a:t>
+            </a:r>
+            <a:r>
+              <a:rPr lang="en-US" altLang="ja-JP" dirty="0"/>
+              <a:t>&amp; b=a;</a:t>
+            </a:r>
+          </a:p>
+          <a:p>
+            <a:pPr marL="0" indent="0">
+              <a:buNone/>
+            </a:pPr>
+            <a:r>
+              <a:rPr lang="en-US" altLang="ja-JP" dirty="0"/>
+              <a:t>    vector&lt;</a:t>
+            </a:r>
+            <a:r>
+              <a:rPr lang="en-US" altLang="ja-JP" dirty="0" err="1"/>
+              <a:t>int</a:t>
+            </a:r>
+            <a:r>
+              <a:rPr lang="en-US" altLang="ja-JP" dirty="0"/>
+              <a:t>&gt; </a:t>
+            </a:r>
+            <a:r>
+              <a:rPr lang="en-US" altLang="ja-JP" dirty="0" err="1"/>
+              <a:t>vec</a:t>
+            </a:r>
+            <a:r>
+              <a:rPr lang="en-US" altLang="ja-JP" dirty="0"/>
+              <a:t>;</a:t>
+            </a:r>
+          </a:p>
+          <a:p>
+            <a:pPr marL="0" indent="0">
+              <a:buNone/>
+            </a:pPr>
+            <a:r>
+              <a:rPr lang="en-US" altLang="ja-JP" dirty="0"/>
+              <a:t>    </a:t>
+            </a:r>
+            <a:r>
+              <a:rPr lang="en-US" altLang="ja-JP" dirty="0" err="1"/>
               <a:t>vec.push_back</a:t>
             </a:r>
             <a:r>
+              <a:rPr lang="en-US" altLang="ja-JP" dirty="0"/>
+              <a:t>(a);</a:t>
+            </a:r>
+          </a:p>
+          <a:p>
+            <a:pPr marL="0" indent="0">
+              <a:buNone/>
+            </a:pPr>
+            <a:r>
+              <a:rPr lang="en-US" altLang="ja-JP" dirty="0"/>
+              <a:t>    </a:t>
+            </a:r>
+            <a:r>
+              <a:rPr lang="en-US" altLang="ja-JP" dirty="0" err="1"/>
+              <a:t>vec.push_back</a:t>
+            </a:r>
+            <a:r>
+              <a:rPr lang="en-US" altLang="ja-JP" dirty="0"/>
+              <a:t>(b);</a:t>
+            </a:r>
+          </a:p>
+          <a:p>
+            <a:pPr marL="0" indent="0">
+              <a:buNone/>
+            </a:pPr>
+            <a:r>
+              <a:rPr lang="en-US" altLang="ja-JP" dirty="0"/>
+              <a:t>    a=2;</a:t>
+            </a:r>
+          </a:p>
+          <a:p>
+            <a:pPr marL="0" indent="0">
+              <a:buNone/>
+            </a:pPr>
+            <a:r>
+              <a:rPr lang="en-US" altLang="ja-JP" dirty="0"/>
+              <a:t>    </a:t>
+            </a:r>
+            <a:r>
+              <a:rPr lang="en-US" altLang="ja-JP" dirty="0" err="1"/>
+              <a:t>vec</a:t>
+            </a:r>
+            <a:r>
+              <a:rPr lang="en-US" altLang="ja-JP" dirty="0"/>
+              <a:t>[1]=3;</a:t>
+            </a:r>
+          </a:p>
+          <a:p>
+            <a:pPr marL="0" indent="0">
+              <a:buNone/>
+            </a:pPr>
+            <a:r>
+              <a:rPr lang="en-US" altLang="ja-JP" dirty="0"/>
+              <a:t>    </a:t>
+            </a:r>
+            <a:r>
+              <a:rPr lang="en-US" altLang="ja-JP" dirty="0" err="1"/>
+              <a:t>printf</a:t>
+            </a:r>
+            <a:r>
+              <a:rPr lang="en-US" altLang="ja-JP" dirty="0"/>
+              <a:t>("%d %d %d %d\n", a, b, </a:t>
+            </a:r>
+            <a:r>
+              <a:rPr lang="en-US" altLang="ja-JP" dirty="0" err="1"/>
+              <a:t>vec</a:t>
+            </a:r>
+            <a:r>
+              <a:rPr lang="en-US" altLang="ja-JP" dirty="0"/>
+              <a:t>[0], </a:t>
+            </a:r>
+            <a:r>
+              <a:rPr lang="en-US" altLang="ja-JP" dirty="0" err="1"/>
+              <a:t>vec</a:t>
+            </a:r>
+            <a:r>
+              <a:rPr lang="en-US" altLang="ja-JP" dirty="0"/>
+              <a:t>[1</a:t>
+            </a:r>
+            <a:r>
               <a:rPr lang="en-US" altLang="ja-JP" dirty="0" smtClean="0"/>
-              <a:t>(b);</a:t>
+              <a:t>]);</a:t>
             </a:r>
           </a:p>
           <a:p>
@@ -4489,68 +4523,321 @@
               <a:buNone/>
             </a:pPr>
             <a:r>
-              <a:rPr kumimoji="1" lang="en-US" altLang="ja-JP" dirty="0"/>
-              <a:t> </a:t>
-            </a:r>
-            <a:r>
-              <a:rPr kumimoji="1" lang="en-US" altLang="ja-JP" dirty="0" smtClean="0"/>
-              <a:t>   return </a:t>
-            </a:r>
-            <a:r>
-              <a:rPr kumimoji="1" lang="en-US" altLang="ja-JP" dirty="0" err="1" smtClean="0"/>
-              <a:t>vec</a:t>
-            </a:r>
-            <a:r>
-              <a:rPr kumimoji="1" lang="en-US" altLang="ja-JP" dirty="0" smtClean="0"/>
-              <a:t>; // </a:t>
-            </a:r>
-            <a:r>
-              <a:rPr lang="en-US" altLang="ja-JP" dirty="0" smtClean="0"/>
-              <a:t>move </a:t>
-            </a:r>
-            <a:r>
-              <a:rPr lang="ja-JP" altLang="en-US" dirty="0" smtClean="0"/>
-              <a:t>の出番。</a:t>
-            </a:r>
-            <a:endParaRPr kumimoji="1" lang="en-US" altLang="ja-JP" dirty="0" smtClean="0"/>
+              <a:rPr kumimoji="1" lang="ja-JP" altLang="en-US" dirty="0" smtClean="0"/>
+              <a:t>結果</a:t>
+            </a:r>
+            <a:endParaRPr kumimoji="1" lang="en-US" altLang="ja-JP" dirty="0"/>
           </a:p>
           <a:p>
             <a:pPr marL="0" indent="0">
               <a:buNone/>
             </a:pPr>
             <a:r>
-              <a:rPr lang="en-US" altLang="ja-JP" dirty="0" smtClean="0"/>
-              <a:t>}</a:t>
-            </a:r>
-          </a:p>
-          <a:p>
-            <a:pPr marL="0" indent="0">
-              <a:buNone/>
-            </a:pPr>
-            <a:r>
-              <a:rPr lang="en-US" altLang="ja-JP" dirty="0" smtClean="0"/>
-              <a:t>vector&lt;Base&gt; ret = </a:t>
-            </a:r>
-            <a:r>
-              <a:rPr lang="en-US" altLang="ja-JP" dirty="0" err="1" smtClean="0"/>
-              <a:t>func</a:t>
-            </a:r>
-            <a:r>
-              <a:rPr lang="en-US" altLang="ja-JP" dirty="0" smtClean="0"/>
-              <a:t>(); // </a:t>
-            </a:r>
-            <a:r>
-              <a:rPr lang="ja-JP" altLang="en-US" dirty="0" smtClean="0"/>
-              <a:t>コンテナのコピーは、中身もコピー。</a:t>
+              <a:rPr lang="en-US" altLang="ja" dirty="0"/>
+              <a:t>2 2 1 3</a:t>
             </a:r>
             <a:endParaRPr kumimoji="1" lang="ja-JP" altLang="en-US" dirty="0"/>
+          </a:p>
+        </p:txBody>
+      </p:sp>
+      <p:sp>
+        <p:nvSpPr>
+          <p:cNvPr id="7" name="正方形/長方形 6"/>
+          <p:cNvSpPr/>
+          <p:nvPr/>
+        </p:nvSpPr>
+        <p:spPr>
+          <a:xfrm>
+            <a:off x="6650182" y="3350515"/>
+            <a:ext cx="1600200" cy="581891"/>
+          </a:xfrm>
+          <a:prstGeom prst="rect">
+            <a:avLst/>
+          </a:prstGeom>
+        </p:spPr>
+        <p:style>
+          <a:lnRef idx="2">
+            <a:schemeClr val="accent1">
+              <a:shade val="50000"/>
+            </a:schemeClr>
+          </a:lnRef>
+          <a:fillRef idx="1">
+            <a:schemeClr val="accent1"/>
+          </a:fillRef>
+          <a:effectRef idx="0">
+            <a:schemeClr val="accent1"/>
+          </a:effectRef>
+          <a:fontRef idx="minor">
+            <a:schemeClr val="lt1"/>
+          </a:fontRef>
+        </p:style>
+        <p:txBody>
+          <a:bodyPr rtlCol="0" anchor="ctr"/>
+          <a:lstStyle/>
+          <a:p>
+            <a:pPr algn="ctr"/>
+            <a:endParaRPr kumimoji="1" lang="ja-JP" altLang="en-US"/>
+          </a:p>
+        </p:txBody>
+      </p:sp>
+      <p:sp>
+        <p:nvSpPr>
+          <p:cNvPr id="8" name="正方形/長方形 7"/>
+          <p:cNvSpPr/>
+          <p:nvPr/>
+        </p:nvSpPr>
+        <p:spPr>
+          <a:xfrm>
+            <a:off x="8354291" y="3350515"/>
+            <a:ext cx="1600200" cy="581891"/>
+          </a:xfrm>
+          <a:prstGeom prst="rect">
+            <a:avLst/>
+          </a:prstGeom>
+          <a:solidFill>
+            <a:schemeClr val="accent6">
+              <a:lumMod val="40000"/>
+              <a:lumOff val="60000"/>
+            </a:schemeClr>
+          </a:solidFill>
+        </p:spPr>
+        <p:style>
+          <a:lnRef idx="2">
+            <a:schemeClr val="accent1">
+              <a:shade val="50000"/>
+            </a:schemeClr>
+          </a:lnRef>
+          <a:fillRef idx="1">
+            <a:schemeClr val="accent1"/>
+          </a:fillRef>
+          <a:effectRef idx="0">
+            <a:schemeClr val="accent1"/>
+          </a:effectRef>
+          <a:fontRef idx="minor">
+            <a:schemeClr val="lt1"/>
+          </a:fontRef>
+        </p:style>
+        <p:txBody>
+          <a:bodyPr rtlCol="0" anchor="ctr"/>
+          <a:lstStyle/>
+          <a:p>
+            <a:pPr algn="ctr"/>
+            <a:endParaRPr kumimoji="1" lang="ja-JP" altLang="en-US"/>
+          </a:p>
+        </p:txBody>
+      </p:sp>
+      <p:sp>
+        <p:nvSpPr>
+          <p:cNvPr id="9" name="正方形/長方形 8"/>
+          <p:cNvSpPr/>
+          <p:nvPr/>
+        </p:nvSpPr>
+        <p:spPr>
+          <a:xfrm>
+            <a:off x="6650182" y="1498556"/>
+            <a:ext cx="1600200" cy="581891"/>
+          </a:xfrm>
+          <a:prstGeom prst="rect">
+            <a:avLst/>
+          </a:prstGeom>
+          <a:solidFill>
+            <a:schemeClr val="accent4">
+              <a:lumMod val="40000"/>
+              <a:lumOff val="60000"/>
+            </a:schemeClr>
+          </a:solidFill>
+        </p:spPr>
+        <p:style>
+          <a:lnRef idx="2">
+            <a:schemeClr val="accent1">
+              <a:shade val="50000"/>
+            </a:schemeClr>
+          </a:lnRef>
+          <a:fillRef idx="1">
+            <a:schemeClr val="accent1"/>
+          </a:fillRef>
+          <a:effectRef idx="0">
+            <a:schemeClr val="accent1"/>
+          </a:effectRef>
+          <a:fontRef idx="minor">
+            <a:schemeClr val="lt1"/>
+          </a:fontRef>
+        </p:style>
+        <p:txBody>
+          <a:bodyPr rtlCol="0" anchor="ctr"/>
+          <a:lstStyle/>
+          <a:p>
+            <a:pPr algn="ctr"/>
+            <a:endParaRPr kumimoji="1" lang="ja-JP" altLang="en-US"/>
+          </a:p>
+        </p:txBody>
+      </p:sp>
+      <p:cxnSp>
+        <p:nvCxnSpPr>
+          <p:cNvPr id="15" name="直線矢印コネクタ 14"/>
+          <p:cNvCxnSpPr/>
+          <p:nvPr/>
+        </p:nvCxnSpPr>
+        <p:spPr>
+          <a:xfrm>
+            <a:off x="2697480" y="1652341"/>
+            <a:ext cx="3749040" cy="0"/>
+          </a:xfrm>
+          <a:prstGeom prst="straightConnector1">
+            <a:avLst/>
+          </a:prstGeom>
+          <a:ln w="101600">
+            <a:tailEnd type="triangle"/>
+          </a:ln>
+        </p:spPr>
+        <p:style>
+          <a:lnRef idx="1">
+            <a:schemeClr val="accent1"/>
+          </a:lnRef>
+          <a:fillRef idx="0">
+            <a:schemeClr val="accent1"/>
+          </a:fillRef>
+          <a:effectRef idx="0">
+            <a:schemeClr val="accent1"/>
+          </a:effectRef>
+          <a:fontRef idx="minor">
+            <a:schemeClr val="tx1"/>
+          </a:fontRef>
+        </p:style>
+      </p:cxnSp>
+      <p:cxnSp>
+        <p:nvCxnSpPr>
+          <p:cNvPr id="19" name="直線矢印コネクタ 18"/>
+          <p:cNvCxnSpPr/>
+          <p:nvPr/>
+        </p:nvCxnSpPr>
+        <p:spPr>
+          <a:xfrm>
+            <a:off x="7450282" y="2080447"/>
+            <a:ext cx="0" cy="1051373"/>
+          </a:xfrm>
+          <a:prstGeom prst="straightConnector1">
+            <a:avLst/>
+          </a:prstGeom>
+          <a:ln w="101600">
+            <a:tailEnd type="triangle"/>
+          </a:ln>
+        </p:spPr>
+        <p:style>
+          <a:lnRef idx="1">
+            <a:schemeClr val="accent1"/>
+          </a:lnRef>
+          <a:fillRef idx="0">
+            <a:schemeClr val="accent1"/>
+          </a:fillRef>
+          <a:effectRef idx="0">
+            <a:schemeClr val="accent1"/>
+          </a:effectRef>
+          <a:fontRef idx="minor">
+            <a:schemeClr val="tx1"/>
+          </a:fontRef>
+        </p:style>
+      </p:cxnSp>
+      <p:cxnSp>
+        <p:nvCxnSpPr>
+          <p:cNvPr id="21" name="カギ線コネクタ 20"/>
+          <p:cNvCxnSpPr/>
+          <p:nvPr/>
+        </p:nvCxnSpPr>
+        <p:spPr>
+          <a:xfrm flipV="1">
+            <a:off x="2971800" y="1930024"/>
+            <a:ext cx="3200400" cy="290946"/>
+          </a:xfrm>
+          <a:prstGeom prst="bentConnector3">
+            <a:avLst/>
+          </a:prstGeom>
+          <a:ln w="101600">
+            <a:tailEnd type="triangle"/>
+          </a:ln>
+        </p:spPr>
+        <p:style>
+          <a:lnRef idx="1">
+            <a:schemeClr val="accent1"/>
+          </a:lnRef>
+          <a:fillRef idx="0">
+            <a:schemeClr val="accent1"/>
+          </a:fillRef>
+          <a:effectRef idx="0">
+            <a:schemeClr val="accent1"/>
+          </a:effectRef>
+          <a:fontRef idx="minor">
+            <a:schemeClr val="tx1"/>
+          </a:fontRef>
+        </p:style>
+      </p:cxnSp>
+      <p:cxnSp>
+        <p:nvCxnSpPr>
+          <p:cNvPr id="23" name="直線矢印コネクタ 22"/>
+          <p:cNvCxnSpPr/>
+          <p:nvPr/>
+        </p:nvCxnSpPr>
+        <p:spPr>
+          <a:xfrm>
+            <a:off x="7772400" y="2220970"/>
+            <a:ext cx="1381991" cy="910850"/>
+          </a:xfrm>
+          <a:prstGeom prst="straightConnector1">
+            <a:avLst/>
+          </a:prstGeom>
+          <a:ln w="101600">
+            <a:tailEnd type="triangle"/>
+          </a:ln>
+        </p:spPr>
+        <p:style>
+          <a:lnRef idx="1">
+            <a:schemeClr val="accent1"/>
+          </a:lnRef>
+          <a:fillRef idx="0">
+            <a:schemeClr val="accent1"/>
+          </a:fillRef>
+          <a:effectRef idx="0">
+            <a:schemeClr val="accent1"/>
+          </a:effectRef>
+          <a:fontRef idx="minor">
+            <a:schemeClr val="tx1"/>
+          </a:fontRef>
+        </p:style>
+      </p:cxnSp>
+      <p:sp>
+        <p:nvSpPr>
+          <p:cNvPr id="24" name="テキスト ボックス 23"/>
+          <p:cNvSpPr txBox="1"/>
+          <p:nvPr/>
+        </p:nvSpPr>
+        <p:spPr>
+          <a:xfrm>
+            <a:off x="838200" y="480060"/>
+            <a:ext cx="10248900" cy="830997"/>
+          </a:xfrm>
+          <a:prstGeom prst="rect">
+            <a:avLst/>
+          </a:prstGeom>
+          <a:noFill/>
+        </p:spPr>
+        <p:txBody>
+          <a:bodyPr wrap="square" rtlCol="0">
+            <a:spAutoFit/>
+          </a:bodyPr>
+          <a:lstStyle/>
+          <a:p>
+            <a:r>
+              <a:rPr lang="ja-JP" altLang="en-US" sz="4800" dirty="0" smtClean="0"/>
+              <a:t>そもそも参照をコンテナに入れるって？</a:t>
+            </a:r>
+            <a:endParaRPr kumimoji="1" lang="ja-JP" altLang="en-US" sz="4800" dirty="0"/>
           </a:p>
         </p:txBody>
       </p:sp>
     </p:spTree>
     <p:extLst>
       <p:ext uri="{BB962C8B-B14F-4D97-AF65-F5344CB8AC3E}">
-        <p14:creationId xmlns:p14="http://schemas.microsoft.com/office/powerpoint/2010/main" val="1121553862"/>
+        <p14:creationId xmlns:p14="http://schemas.microsoft.com/office/powerpoint/2010/main" val="1945782509"/>
       </p:ext>
     </p:extLst>
   </p:cSld>
@@ -4593,6 +4880,243 @@
           <a:lstStyle/>
           <a:p>
             <a:r>
+              <a:rPr kumimoji="1" lang="ja-JP" altLang="en-US" dirty="0" smtClean="0"/>
+              <a:t>だから、スタックにあるものを戻しても大丈夫</a:t>
+            </a:r>
+            <a:endParaRPr kumimoji="1" lang="ja-JP" altLang="en-US" dirty="0"/>
+          </a:p>
+        </p:txBody>
+      </p:sp>
+      <p:sp>
+        <p:nvSpPr>
+          <p:cNvPr id="3" name="コンテンツ プレースホルダー 2"/>
+          <p:cNvSpPr>
+            <a:spLocks noGrp="1"/>
+          </p:cNvSpPr>
+          <p:nvPr>
+            <p:ph idx="1"/>
+          </p:nvPr>
+        </p:nvSpPr>
+        <p:spPr>
+          <a:xfrm>
+            <a:off x="838200" y="1288473"/>
+            <a:ext cx="10515600" cy="4888490"/>
+          </a:xfrm>
+        </p:spPr>
+        <p:txBody>
+          <a:bodyPr/>
+          <a:lstStyle/>
+          <a:p>
+            <a:pPr marL="0" indent="0">
+              <a:buNone/>
+            </a:pPr>
+            <a:r>
+              <a:rPr lang="en-US" altLang="ja-JP" dirty="0" smtClean="0"/>
+              <a:t>vector&lt;Base&gt; </a:t>
+            </a:r>
+            <a:r>
+              <a:rPr lang="en-US" altLang="ja-JP" dirty="0" err="1" smtClean="0"/>
+              <a:t>func</a:t>
+            </a:r>
+            <a:r>
+              <a:rPr lang="en-US" altLang="ja-JP" dirty="0" smtClean="0"/>
+              <a:t>() </a:t>
+            </a:r>
+            <a:r>
+              <a:rPr kumimoji="1" lang="en-US" altLang="ja-JP" dirty="0" smtClean="0"/>
+              <a:t>{</a:t>
+            </a:r>
+          </a:p>
+          <a:p>
+            <a:pPr marL="0" indent="0">
+              <a:buNone/>
+            </a:pPr>
+            <a:r>
+              <a:rPr lang="en-US" altLang="ja-JP" dirty="0"/>
+              <a:t> </a:t>
+            </a:r>
+            <a:r>
+              <a:rPr lang="en-US" altLang="ja-JP" dirty="0" smtClean="0"/>
+              <a:t>   Base a;</a:t>
+            </a:r>
+          </a:p>
+          <a:p>
+            <a:pPr marL="0" indent="0">
+              <a:buNone/>
+            </a:pPr>
+            <a:r>
+              <a:rPr kumimoji="1" lang="en-US" altLang="ja-JP" dirty="0" smtClean="0"/>
+              <a:t>    Base b;</a:t>
+            </a:r>
+          </a:p>
+          <a:p>
+            <a:pPr marL="0" indent="0">
+              <a:buNone/>
+            </a:pPr>
+            <a:r>
+              <a:rPr lang="en-US" altLang="ja-JP" dirty="0"/>
+              <a:t> </a:t>
+            </a:r>
+            <a:r>
+              <a:rPr lang="en-US" altLang="ja-JP" dirty="0" smtClean="0"/>
+              <a:t>    vector&lt;Base&gt; </a:t>
+            </a:r>
+            <a:r>
+              <a:rPr lang="en-US" altLang="ja-JP" dirty="0" err="1" smtClean="0"/>
+              <a:t>vec</a:t>
+            </a:r>
+            <a:r>
+              <a:rPr lang="en-US" altLang="ja-JP" dirty="0" smtClean="0"/>
+              <a:t>;</a:t>
+            </a:r>
+          </a:p>
+          <a:p>
+            <a:pPr marL="0" indent="0">
+              <a:buNone/>
+            </a:pPr>
+            <a:r>
+              <a:rPr lang="en-US" altLang="ja-JP" dirty="0"/>
+              <a:t> </a:t>
+            </a:r>
+            <a:r>
+              <a:rPr lang="en-US" altLang="ja-JP" dirty="0" smtClean="0"/>
+              <a:t>   </a:t>
+            </a:r>
+            <a:r>
+              <a:rPr lang="en-US" altLang="ja-JP" dirty="0" err="1" smtClean="0"/>
+              <a:t>vec.push_back</a:t>
+            </a:r>
+            <a:r>
+              <a:rPr lang="en-US" altLang="ja-JP" dirty="0" smtClean="0"/>
+              <a:t>(a);</a:t>
+            </a:r>
+          </a:p>
+          <a:p>
+            <a:pPr marL="0" indent="0">
+              <a:buNone/>
+            </a:pPr>
+            <a:r>
+              <a:rPr lang="en-US" altLang="ja-JP" dirty="0" smtClean="0"/>
+              <a:t>    </a:t>
+            </a:r>
+            <a:r>
+              <a:rPr lang="en-US" altLang="ja-JP" dirty="0" err="1" smtClean="0"/>
+              <a:t>vec.push_back</a:t>
+            </a:r>
+            <a:r>
+              <a:rPr lang="en-US" altLang="ja-JP" dirty="0" smtClean="0"/>
+              <a:t>(b);</a:t>
+            </a:r>
+          </a:p>
+          <a:p>
+            <a:pPr marL="0" indent="0">
+              <a:buNone/>
+            </a:pPr>
+            <a:r>
+              <a:rPr kumimoji="1" lang="en-US" altLang="ja-JP" dirty="0"/>
+              <a:t> </a:t>
+            </a:r>
+            <a:r>
+              <a:rPr kumimoji="1" lang="en-US" altLang="ja-JP" dirty="0" smtClean="0"/>
+              <a:t>   return </a:t>
+            </a:r>
+            <a:r>
+              <a:rPr kumimoji="1" lang="en-US" altLang="ja-JP" dirty="0" err="1" smtClean="0"/>
+              <a:t>vec</a:t>
+            </a:r>
+            <a:r>
+              <a:rPr kumimoji="1" lang="en-US" altLang="ja-JP" dirty="0" smtClean="0"/>
+              <a:t>; // </a:t>
+            </a:r>
+            <a:r>
+              <a:rPr lang="en-US" altLang="ja-JP" dirty="0" smtClean="0"/>
+              <a:t>move </a:t>
+            </a:r>
+            <a:r>
+              <a:rPr lang="ja-JP" altLang="en-US" dirty="0" smtClean="0"/>
+              <a:t>の出番。</a:t>
+            </a:r>
+            <a:endParaRPr kumimoji="1" lang="en-US" altLang="ja-JP" dirty="0" smtClean="0"/>
+          </a:p>
+          <a:p>
+            <a:pPr marL="0" indent="0">
+              <a:buNone/>
+            </a:pPr>
+            <a:r>
+              <a:rPr lang="en-US" altLang="ja-JP" dirty="0" smtClean="0"/>
+              <a:t>}</a:t>
+            </a:r>
+          </a:p>
+          <a:p>
+            <a:pPr marL="0" indent="0">
+              <a:buNone/>
+            </a:pPr>
+            <a:r>
+              <a:rPr lang="en-US" altLang="ja-JP" dirty="0" smtClean="0"/>
+              <a:t>vector&lt;Base&gt; ret = </a:t>
+            </a:r>
+            <a:r>
+              <a:rPr lang="en-US" altLang="ja-JP" dirty="0" err="1" smtClean="0"/>
+              <a:t>func</a:t>
+            </a:r>
+            <a:r>
+              <a:rPr lang="en-US" altLang="ja-JP" dirty="0" smtClean="0"/>
+              <a:t>(); // </a:t>
+            </a:r>
+            <a:r>
+              <a:rPr lang="ja-JP" altLang="en-US" dirty="0" smtClean="0"/>
+              <a:t>コンテナのコピーは、中身もコピー。</a:t>
+            </a:r>
+            <a:endParaRPr kumimoji="1" lang="ja-JP" altLang="en-US" dirty="0"/>
+          </a:p>
+        </p:txBody>
+      </p:sp>
+    </p:spTree>
+    <p:extLst>
+      <p:ext uri="{BB962C8B-B14F-4D97-AF65-F5344CB8AC3E}">
+        <p14:creationId xmlns:p14="http://schemas.microsoft.com/office/powerpoint/2010/main" val="1121553862"/>
+      </p:ext>
+    </p:extLst>
+  </p:cSld>
+  <p:clrMapOvr>
+    <a:masterClrMapping/>
+  </p:clrMapOvr>
+</p:sld>
+</file>
+
+<file path=ppt/slides/slide7.xml><?xml version="1.0" encoding="utf-8"?>
+<p:sld xmlns:a="http://schemas.openxmlformats.org/drawingml/2006/main" xmlns:r="http://schemas.openxmlformats.org/officeDocument/2006/relationships" xmlns:p="http://schemas.openxmlformats.org/presentationml/2006/main">
+  <p:cSld>
+    <p:spTree>
+      <p:nvGrpSpPr>
+        <p:cNvPr id="1" name=""/>
+        <p:cNvGrpSpPr/>
+        <p:nvPr/>
+      </p:nvGrpSpPr>
+      <p:grpSpPr>
+        <a:xfrm>
+          <a:off x="0" y="0"/>
+          <a:ext cx="0" cy="0"/>
+          <a:chOff x="0" y="0"/>
+          <a:chExt cx="0" cy="0"/>
+        </a:xfrm>
+      </p:grpSpPr>
+      <p:sp>
+        <p:nvSpPr>
+          <p:cNvPr id="2" name="タイトル 1"/>
+          <p:cNvSpPr>
+            <a:spLocks noGrp="1"/>
+          </p:cNvSpPr>
+          <p:nvPr>
+            <p:ph type="title"/>
+          </p:nvPr>
+        </p:nvSpPr>
+        <p:spPr/>
+        <p:txBody>
+          <a:bodyPr/>
+          <a:lstStyle/>
+          <a:p>
+            <a:r>
               <a:rPr kumimoji="1" lang="en-US" altLang="ja-JP" dirty="0" smtClean="0"/>
               <a:t>TODO</a:t>
             </a:r>
@@ -4667,39 +5191,22 @@
             </a:r>
             <a:r>
               <a:rPr lang="ja-JP" altLang="en-US" dirty="0" smtClean="0"/>
-              <a:t>で、リークしない</a:t>
-            </a:r>
-            <a:r>
-              <a:rPr lang="ja-JP" altLang="en-US" dirty="0" smtClean="0"/>
-              <a:t>。</a:t>
+              <a:t>で、リークしない。</a:t>
             </a:r>
             <a:endParaRPr lang="en-US" altLang="ja-JP" dirty="0" smtClean="0"/>
           </a:p>
           <a:p>
             <a:r>
-              <a:rPr lang="ja-JP" altLang="en-US" dirty="0"/>
-              <a:t>参</a:t>
-            </a:r>
-            <a:r>
-              <a:rPr lang="ja-JP" altLang="en-US" dirty="0" smtClean="0"/>
-              <a:t>照って</a:t>
-            </a:r>
-            <a:r>
-              <a:rPr lang="ja-JP" altLang="en-US" dirty="0"/>
-              <a:t>なん</a:t>
-            </a:r>
-            <a:r>
-              <a:rPr lang="ja-JP" altLang="en-US" dirty="0" smtClean="0"/>
-              <a:t>でコンテナに入らない？</a:t>
-            </a:r>
-            <a:endParaRPr lang="en-US" altLang="ja-JP" dirty="0" smtClean="0"/>
-          </a:p>
-          <a:p>
-            <a:r>
-              <a:rPr lang="en-US" altLang="ja-JP" smtClean="0">
+              <a:rPr lang="en-US" altLang="ja-JP" dirty="0" smtClean="0">
                 <a:hlinkClick r:id="rId2"/>
               </a:rPr>
-              <a:t>by kanda.motohiro@gmail.com</a:t>
+              <a:t>by </a:t>
+            </a:r>
+            <a:r>
+              <a:rPr lang="en-US" altLang="ja-JP" dirty="0" smtClean="0">
+                <a:hlinkClick r:id="rId2"/>
+              </a:rPr>
+              <a:t>kanda.motohiro@gmail.com</a:t>
             </a:r>
             <a:endParaRPr lang="en-US" altLang="ja-JP" dirty="0" smtClean="0"/>
           </a:p>

</xml_diff>